<commit_message>
changes for django-bureaucracy compatibility
</commit_message>
<xml_diff>
--- a/tests/powerpoint/files/hyperlink.pptx
+++ b/tests/powerpoint/files/hyperlink.pptx
@@ -1,6 +1,6 @@
 
 <file path=ppt/presentation.xml><?xml version="1.0" encoding="utf-8"?>
-<p:presentation xmlns:a="http://schemas.openxmlformats.org/drawingml/2006/main" xmlns:r="http://schemas.openxmlformats.org/officeDocument/2006/relationships" xmlns:p="http://schemas.openxmlformats.org/presentationml/2006/main" strictFirstAndLastChars="0" embedTrueTypeFonts="1" saveSubsetFonts="1" autoCompressPictures="0">
+<p:presentation xmlns:a="http://schemas.openxmlformats.org/drawingml/2006/main" xmlns:r="http://schemas.openxmlformats.org/officeDocument/2006/relationships" xmlns:p="http://schemas.openxmlformats.org/presentationml/2006/main" strictFirstAndLastChars="0" saveSubsetFonts="1" autoCompressPictures="0">
   <p:sldMasterIdLst>
     <p:sldMasterId id="2147483695" r:id="rId1"/>
   </p:sldMasterIdLst>
@@ -15,15 +15,6 @@
   </p:sldIdLst>
   <p:sldSz cx="9144000" cy="5143500" type="screen16x9"/>
   <p:notesSz cx="6858000" cy="9144000"/>
-  <p:embeddedFontLst>
-    <p:embeddedFont>
-      <p:font typeface="Proxima Nova" panose="020B0604020202020204" charset="0"/>
-      <p:regular r:id="rId5"/>
-      <p:bold r:id="rId6"/>
-      <p:italic r:id="rId7"/>
-      <p:boldItalic r:id="rId8"/>
-    </p:embeddedFont>
-  </p:embeddedFontLst>
   <p:defaultTextStyle>
     <a:defPPr marR="0" lvl="0" algn="l" rtl="0">
       <a:lnSpc>
@@ -325,7 +316,7 @@
           <a:p>
             <a:fld id="{305AD3C7-2DE5-428E-9244-7C83F5BE7FBC}" type="datetimeFigureOut">
               <a:rPr lang="en-US" smtClean="0"/>
-              <a:t>3/13/2017</a:t>
+              <a:t>3/15/17</a:t>
             </a:fld>
             <a:endParaRPr lang="en-US"/>
           </a:p>
@@ -391,7 +382,7 @@
           <a:p>
             <a:fld id="{501475AD-9184-42CC-898B-4F640C14B447}" type="slidenum">
               <a:rPr lang="en-US" smtClean="0"/>
-              <a:t>‹#›</a:t>
+              <a:t>‹nr.›</a:t>
             </a:fld>
             <a:endParaRPr lang="en-US"/>
           </a:p>
@@ -693,54 +684,29 @@
       </p:grpSpPr>
       <p:sp>
         <p:nvSpPr>
-          <p:cNvPr id="5" name="Text Placeholder 4"/>
+          <p:cNvPr id="3" name="Tijdelijke aanduiding voor tekst 2"/>
           <p:cNvSpPr>
             <a:spLocks noGrp="1"/>
           </p:cNvSpPr>
           <p:nvPr>
-            <p:ph type="body" sz="quarter" idx="13" hasCustomPrompt="1"/>
+            <p:ph type="body" sz="quarter" idx="10"/>
           </p:nvPr>
         </p:nvSpPr>
         <p:spPr>
           <a:xfrm>
-            <a:off x="2194560" y="2416302"/>
-            <a:ext cx="4751387" cy="307777"/>
+            <a:off x="481013" y="2030413"/>
+            <a:ext cx="7651750" cy="1087437"/>
           </a:xfrm>
           <a:prstGeom prst="rect">
             <a:avLst/>
           </a:prstGeom>
         </p:spPr>
         <p:txBody>
-          <a:bodyPr anchor="ctr" anchorCtr="0">
-            <a:spAutoFit/>
-          </a:bodyPr>
-          <a:lstStyle>
-            <a:lvl1pPr algn="ctr">
-              <a:defRPr/>
-            </a:lvl1pPr>
-          </a:lstStyle>
+          <a:bodyPr/>
+          <a:lstStyle/>
           <a:p>
             <a:pPr lvl="0"/>
-            <a:r>
-              <a:rPr lang="en-US" dirty="0"/>
-              <a:t>{% link </a:t>
-            </a:r>
-            <a:r>
-              <a:rPr lang="en-US" dirty="0" err="1"/>
-              <a:t>obj.link</a:t>
-            </a:r>
-            <a:r>
-              <a:rPr lang="en-US" dirty="0"/>
-              <a:t> </a:t>
-            </a:r>
-            <a:r>
-              <a:rPr lang="en-US" dirty="0" err="1"/>
-              <a:t>obj.desc</a:t>
-            </a:r>
-            <a:r>
-              <a:rPr lang="en-US" dirty="0"/>
-              <a:t> %}</a:t>
-            </a:r>
+            <a:endParaRPr lang="nl-NL" dirty="0"/>
           </a:p>
         </p:txBody>
       </p:sp>
@@ -1314,12 +1280,12 @@
       </p:grpSpPr>
       <p:sp>
         <p:nvSpPr>
-          <p:cNvPr id="5" name="Text Placeholder 4"/>
+          <p:cNvPr id="2" name="Tijdelijke aanduiding voor tekst 1"/>
           <p:cNvSpPr>
             <a:spLocks noGrp="1"/>
           </p:cNvSpPr>
           <p:nvPr>
-            <p:ph type="body" sz="quarter" idx="13"/>
+            <p:ph type="body" sz="quarter" idx="10"/>
           </p:nvPr>
         </p:nvSpPr>
         <p:spPr/>
@@ -1327,14 +1293,14 @@
           <a:bodyPr/>
           <a:lstStyle/>
           <a:p>
-            <a:endParaRPr lang="en-US"/>
+            <a:endParaRPr lang="nl-NL"/>
           </a:p>
         </p:txBody>
       </p:sp>
     </p:spTree>
     <p:extLst>
       <p:ext uri="{BB962C8B-B14F-4D97-AF65-F5344CB8AC3E}">
-        <p14:creationId xmlns:p14="http://schemas.microsoft.com/office/powerpoint/2010/main" val="2005677112"/>
+        <p14:creationId xmlns:p14="http://schemas.microsoft.com/office/powerpoint/2010/main" val="819769419"/>
       </p:ext>
     </p:extLst>
   </p:cSld>

</xml_diff>